<commit_message>
Add Presentation_1106_JiayuChen.pptx and Presentation_1106_JiayuChen_FMM.pptx
</commit_message>
<xml_diff>
--- a/Presentation_1106_JiayuChen.pptx
+++ b/Presentation_1106_JiayuChen.pptx
@@ -227,7 +227,7 @@
           <a:p>
             <a:fld id="{F724740E-8F52-4821-8A8D-03DDEC038A3B}" type="datetimeFigureOut">
               <a:rPr lang="zh-CN" altLang="en-US" smtClean="0"/>
-              <a:t>2023-11-06</a:t>
+              <a:t>2023-11-07</a:t>
             </a:fld>
             <a:endParaRPr lang="zh-CN" altLang="en-US"/>
           </a:p>
@@ -2255,7 +2255,7 @@
           <a:p>
             <a:fld id="{5647DC1B-4743-47FE-A400-A2B750CAD470}" type="datetimeFigureOut">
               <a:rPr lang="zh-CN" altLang="en-US" smtClean="0"/>
-              <a:t>2023-11-06</a:t>
+              <a:t>2023-11-07</a:t>
             </a:fld>
             <a:endParaRPr lang="zh-CN" altLang="en-US"/>
           </a:p>
@@ -2453,7 +2453,7 @@
           <a:p>
             <a:fld id="{5647DC1B-4743-47FE-A400-A2B750CAD470}" type="datetimeFigureOut">
               <a:rPr lang="zh-CN" altLang="en-US" smtClean="0"/>
-              <a:t>2023-11-06</a:t>
+              <a:t>2023-11-07</a:t>
             </a:fld>
             <a:endParaRPr lang="zh-CN" altLang="en-US"/>
           </a:p>
@@ -2661,7 +2661,7 @@
           <a:p>
             <a:fld id="{5647DC1B-4743-47FE-A400-A2B750CAD470}" type="datetimeFigureOut">
               <a:rPr lang="zh-CN" altLang="en-US" smtClean="0"/>
-              <a:t>2023-11-06</a:t>
+              <a:t>2023-11-07</a:t>
             </a:fld>
             <a:endParaRPr lang="zh-CN" altLang="en-US"/>
           </a:p>
@@ -2859,7 +2859,7 @@
           <a:p>
             <a:fld id="{5647DC1B-4743-47FE-A400-A2B750CAD470}" type="datetimeFigureOut">
               <a:rPr lang="zh-CN" altLang="en-US" smtClean="0"/>
-              <a:t>2023-11-06</a:t>
+              <a:t>2023-11-07</a:t>
             </a:fld>
             <a:endParaRPr lang="zh-CN" altLang="en-US"/>
           </a:p>
@@ -3134,7 +3134,7 @@
           <a:p>
             <a:fld id="{5647DC1B-4743-47FE-A400-A2B750CAD470}" type="datetimeFigureOut">
               <a:rPr lang="zh-CN" altLang="en-US" smtClean="0"/>
-              <a:t>2023-11-06</a:t>
+              <a:t>2023-11-07</a:t>
             </a:fld>
             <a:endParaRPr lang="zh-CN" altLang="en-US"/>
           </a:p>
@@ -3399,7 +3399,7 @@
           <a:p>
             <a:fld id="{5647DC1B-4743-47FE-A400-A2B750CAD470}" type="datetimeFigureOut">
               <a:rPr lang="zh-CN" altLang="en-US" smtClean="0"/>
-              <a:t>2023-11-06</a:t>
+              <a:t>2023-11-07</a:t>
             </a:fld>
             <a:endParaRPr lang="zh-CN" altLang="en-US"/>
           </a:p>
@@ -3811,7 +3811,7 @@
           <a:p>
             <a:fld id="{5647DC1B-4743-47FE-A400-A2B750CAD470}" type="datetimeFigureOut">
               <a:rPr lang="zh-CN" altLang="en-US" smtClean="0"/>
-              <a:t>2023-11-06</a:t>
+              <a:t>2023-11-07</a:t>
             </a:fld>
             <a:endParaRPr lang="zh-CN" altLang="en-US"/>
           </a:p>
@@ -3952,7 +3952,7 @@
           <a:p>
             <a:fld id="{5647DC1B-4743-47FE-A400-A2B750CAD470}" type="datetimeFigureOut">
               <a:rPr lang="zh-CN" altLang="en-US" smtClean="0"/>
-              <a:t>2023-11-06</a:t>
+              <a:t>2023-11-07</a:t>
             </a:fld>
             <a:endParaRPr lang="zh-CN" altLang="en-US"/>
           </a:p>
@@ -4065,7 +4065,7 @@
           <a:p>
             <a:fld id="{5647DC1B-4743-47FE-A400-A2B750CAD470}" type="datetimeFigureOut">
               <a:rPr lang="zh-CN" altLang="en-US" smtClean="0"/>
-              <a:t>2023-11-06</a:t>
+              <a:t>2023-11-07</a:t>
             </a:fld>
             <a:endParaRPr lang="zh-CN" altLang="en-US"/>
           </a:p>
@@ -4376,7 +4376,7 @@
           <a:p>
             <a:fld id="{5647DC1B-4743-47FE-A400-A2B750CAD470}" type="datetimeFigureOut">
               <a:rPr lang="zh-CN" altLang="en-US" smtClean="0"/>
-              <a:t>2023-11-06</a:t>
+              <a:t>2023-11-07</a:t>
             </a:fld>
             <a:endParaRPr lang="zh-CN" altLang="en-US"/>
           </a:p>
@@ -4664,7 +4664,7 @@
           <a:p>
             <a:fld id="{5647DC1B-4743-47FE-A400-A2B750CAD470}" type="datetimeFigureOut">
               <a:rPr lang="zh-CN" altLang="en-US" smtClean="0"/>
-              <a:t>2023-11-06</a:t>
+              <a:t>2023-11-07</a:t>
             </a:fld>
             <a:endParaRPr lang="zh-CN" altLang="en-US"/>
           </a:p>
@@ -4905,7 +4905,7 @@
           <a:p>
             <a:fld id="{5647DC1B-4743-47FE-A400-A2B750CAD470}" type="datetimeFigureOut">
               <a:rPr lang="zh-CN" altLang="en-US" smtClean="0"/>
-              <a:t>2023-11-06</a:t>
+              <a:t>2023-11-07</a:t>
             </a:fld>
             <a:endParaRPr lang="zh-CN" altLang="en-US"/>
           </a:p>
@@ -5850,6 +5850,98 @@
           </a:prstGeom>
         </p:spPr>
       </p:pic>
+      <p:sp>
+        <p:nvSpPr>
+          <p:cNvPr id="4" name="文本框 3">
+            <a:extLst>
+              <a:ext uri="{FF2B5EF4-FFF2-40B4-BE49-F238E27FC236}">
+                <a16:creationId xmlns:a16="http://schemas.microsoft.com/office/drawing/2014/main" id="{B70F3605-0C61-4028-8820-7B026695C46E}"/>
+              </a:ext>
+            </a:extLst>
+          </p:cNvPr>
+          <p:cNvSpPr txBox="1"/>
+          <p:nvPr/>
+        </p:nvSpPr>
+        <p:spPr>
+          <a:xfrm>
+            <a:off x="6365772" y="0"/>
+            <a:ext cx="6094770" cy="461665"/>
+          </a:xfrm>
+          <a:prstGeom prst="rect">
+            <a:avLst/>
+          </a:prstGeom>
+          <a:noFill/>
+        </p:spPr>
+        <p:txBody>
+          <a:bodyPr wrap="square">
+            <a:spAutoFit/>
+          </a:bodyPr>
+          <a:lstStyle/>
+          <a:p>
+            <a:r>
+              <a:rPr lang="en-US" altLang="zh-CN" sz="1200" b="0" i="0" dirty="0" err="1">
+                <a:solidFill>
+                  <a:srgbClr val="222222"/>
+                </a:solidFill>
+                <a:effectLst/>
+                <a:latin typeface="Arial" panose="020B0604020202020204" pitchFamily="34" charset="0"/>
+              </a:rPr>
+              <a:t>Petitjean</a:t>
+            </a:r>
+            <a:r>
+              <a:rPr lang="en-US" altLang="zh-CN" sz="1200" b="0" i="0" dirty="0">
+                <a:solidFill>
+                  <a:srgbClr val="222222"/>
+                </a:solidFill>
+                <a:effectLst/>
+                <a:latin typeface="Arial" panose="020B0604020202020204" pitchFamily="34" charset="0"/>
+              </a:rPr>
+              <a:t> F, </a:t>
+            </a:r>
+            <a:r>
+              <a:rPr lang="en-US" altLang="zh-CN" sz="1200" b="0" i="0" dirty="0" err="1">
+                <a:solidFill>
+                  <a:srgbClr val="222222"/>
+                </a:solidFill>
+                <a:effectLst/>
+                <a:latin typeface="Arial" panose="020B0604020202020204" pitchFamily="34" charset="0"/>
+              </a:rPr>
+              <a:t>Ketterlin</a:t>
+            </a:r>
+            <a:r>
+              <a:rPr lang="en-US" altLang="zh-CN" sz="1200" b="0" i="0" dirty="0">
+                <a:solidFill>
+                  <a:srgbClr val="222222"/>
+                </a:solidFill>
+                <a:effectLst/>
+                <a:latin typeface="Arial" panose="020B0604020202020204" pitchFamily="34" charset="0"/>
+              </a:rPr>
+              <a:t> A, </a:t>
+            </a:r>
+            <a:r>
+              <a:rPr lang="en-US" altLang="zh-CN" sz="1200" b="0" i="0" dirty="0" err="1">
+                <a:solidFill>
+                  <a:srgbClr val="222222"/>
+                </a:solidFill>
+                <a:effectLst/>
+                <a:latin typeface="Arial" panose="020B0604020202020204" pitchFamily="34" charset="0"/>
+              </a:rPr>
+              <a:t>Gançarski</a:t>
+            </a:r>
+            <a:r>
+              <a:rPr lang="en-US" altLang="zh-CN" sz="1200" b="0" i="0" dirty="0">
+                <a:solidFill>
+                  <a:srgbClr val="222222"/>
+                </a:solidFill>
+                <a:effectLst/>
+                <a:latin typeface="Arial" panose="020B0604020202020204" pitchFamily="34" charset="0"/>
+              </a:rPr>
+              <a:t> P. A global averaging method for dynamic time warping, with applications to clustering[J]. Pattern recognition, 2011, 44(3): 678-693.</a:t>
+            </a:r>
+            <a:endParaRPr lang="zh-CN" altLang="en-US" sz="1200" dirty="0"/>
+          </a:p>
+        </p:txBody>
+      </p:sp>
     </p:spTree>
     <p:extLst>
       <p:ext uri="{BB962C8B-B14F-4D97-AF65-F5344CB8AC3E}">
@@ -6072,6 +6164,88 @@
               <a:rPr lang="en-US" altLang="zh-CN" dirty="0"/>
               <a:t>Derivative</a:t>
             </a:r>
+          </a:p>
+        </p:txBody>
+      </p:sp>
+      <p:sp>
+        <p:nvSpPr>
+          <p:cNvPr id="3" name="文本框 2">
+            <a:extLst>
+              <a:ext uri="{FF2B5EF4-FFF2-40B4-BE49-F238E27FC236}">
+                <a16:creationId xmlns:a16="http://schemas.microsoft.com/office/drawing/2014/main" id="{DAA0D7C9-8180-7B42-161A-85C2F2440028}"/>
+              </a:ext>
+            </a:extLst>
+          </p:cNvPr>
+          <p:cNvSpPr txBox="1"/>
+          <p:nvPr/>
+        </p:nvSpPr>
+        <p:spPr>
+          <a:xfrm>
+            <a:off x="6096000" y="78105"/>
+            <a:ext cx="6094770" cy="461665"/>
+          </a:xfrm>
+          <a:prstGeom prst="rect">
+            <a:avLst/>
+          </a:prstGeom>
+          <a:noFill/>
+        </p:spPr>
+        <p:txBody>
+          <a:bodyPr wrap="square">
+            <a:spAutoFit/>
+          </a:bodyPr>
+          <a:lstStyle/>
+          <a:p>
+            <a:r>
+              <a:rPr lang="en-US" altLang="zh-CN" sz="1200" b="0" i="0" dirty="0">
+                <a:solidFill>
+                  <a:srgbClr val="222222"/>
+                </a:solidFill>
+                <a:effectLst/>
+                <a:latin typeface="Arial" panose="020B0604020202020204" pitchFamily="34" charset="0"/>
+              </a:rPr>
+              <a:t>Zhao J, </a:t>
+            </a:r>
+            <a:r>
+              <a:rPr lang="en-US" altLang="zh-CN" sz="1200" b="0" i="0" dirty="0" err="1">
+                <a:solidFill>
+                  <a:srgbClr val="222222"/>
+                </a:solidFill>
+                <a:effectLst/>
+                <a:latin typeface="Arial" panose="020B0604020202020204" pitchFamily="34" charset="0"/>
+              </a:rPr>
+              <a:t>Itti</a:t>
+            </a:r>
+            <a:r>
+              <a:rPr lang="en-US" altLang="zh-CN" sz="1200" b="0" i="0" dirty="0">
+                <a:solidFill>
+                  <a:srgbClr val="222222"/>
+                </a:solidFill>
+                <a:effectLst/>
+                <a:latin typeface="Arial" panose="020B0604020202020204" pitchFamily="34" charset="0"/>
+              </a:rPr>
+              <a:t> L. </a:t>
+            </a:r>
+            <a:r>
+              <a:rPr lang="en-US" altLang="zh-CN" sz="1200" b="0" i="0" dirty="0" err="1">
+                <a:solidFill>
+                  <a:srgbClr val="222222"/>
+                </a:solidFill>
+                <a:effectLst/>
+                <a:latin typeface="Arial" panose="020B0604020202020204" pitchFamily="34" charset="0"/>
+              </a:rPr>
+              <a:t>shapedtw</a:t>
+            </a:r>
+            <a:r>
+              <a:rPr lang="en-US" altLang="zh-CN" sz="1200" b="0" i="0" dirty="0">
+                <a:solidFill>
+                  <a:srgbClr val="222222"/>
+                </a:solidFill>
+                <a:effectLst/>
+                <a:latin typeface="Arial" panose="020B0604020202020204" pitchFamily="34" charset="0"/>
+              </a:rPr>
+              <a:t>: Shape dynamic time warping[J]. Pattern Recognition, 2018, 74: 171-184.</a:t>
+            </a:r>
+            <a:endParaRPr lang="zh-CN" altLang="en-US" sz="1200" dirty="0"/>
           </a:p>
         </p:txBody>
       </p:sp>
@@ -6423,6 +6597,78 @@
               <a:rPr lang="en-US" altLang="zh-CN" dirty="0"/>
               <a:t>KSC: K-Spectral Centroid Clustering</a:t>
             </a:r>
+          </a:p>
+        </p:txBody>
+      </p:sp>
+      <p:sp>
+        <p:nvSpPr>
+          <p:cNvPr id="3" name="文本框 2">
+            <a:extLst>
+              <a:ext uri="{FF2B5EF4-FFF2-40B4-BE49-F238E27FC236}">
+                <a16:creationId xmlns:a16="http://schemas.microsoft.com/office/drawing/2014/main" id="{FC6AE8EB-51B3-63E5-94CE-D2B0E63AAEE1}"/>
+              </a:ext>
+            </a:extLst>
+          </p:cNvPr>
+          <p:cNvSpPr txBox="1"/>
+          <p:nvPr/>
+        </p:nvSpPr>
+        <p:spPr>
+          <a:xfrm>
+            <a:off x="6097230" y="0"/>
+            <a:ext cx="6094770" cy="600164"/>
+          </a:xfrm>
+          <a:prstGeom prst="rect">
+            <a:avLst/>
+          </a:prstGeom>
+          <a:noFill/>
+        </p:spPr>
+        <p:txBody>
+          <a:bodyPr wrap="square">
+            <a:spAutoFit/>
+          </a:bodyPr>
+          <a:lstStyle/>
+          <a:p>
+            <a:r>
+              <a:rPr lang="en-US" altLang="zh-CN" sz="1100" b="0" i="0" dirty="0" err="1">
+                <a:solidFill>
+                  <a:srgbClr val="222222"/>
+                </a:solidFill>
+                <a:effectLst/>
+                <a:latin typeface="Arial" panose="020B0604020202020204" pitchFamily="34" charset="0"/>
+              </a:rPr>
+              <a:t>Paparrizos</a:t>
+            </a:r>
+            <a:r>
+              <a:rPr lang="en-US" altLang="zh-CN" sz="1100" b="0" i="0" dirty="0">
+                <a:solidFill>
+                  <a:srgbClr val="222222"/>
+                </a:solidFill>
+                <a:effectLst/>
+                <a:latin typeface="Arial" panose="020B0604020202020204" pitchFamily="34" charset="0"/>
+              </a:rPr>
+              <a:t> J, </a:t>
+            </a:r>
+            <a:r>
+              <a:rPr lang="en-US" altLang="zh-CN" sz="1100" b="0" i="0" dirty="0" err="1">
+                <a:solidFill>
+                  <a:srgbClr val="222222"/>
+                </a:solidFill>
+                <a:effectLst/>
+                <a:latin typeface="Arial" panose="020B0604020202020204" pitchFamily="34" charset="0"/>
+              </a:rPr>
+              <a:t>Gravano</a:t>
+            </a:r>
+            <a:r>
+              <a:rPr lang="en-US" altLang="zh-CN" sz="1100" b="0" i="0" dirty="0">
+                <a:solidFill>
+                  <a:srgbClr val="222222"/>
+                </a:solidFill>
+                <a:effectLst/>
+                <a:latin typeface="Arial" panose="020B0604020202020204" pitchFamily="34" charset="0"/>
+              </a:rPr>
+              <a:t> L. k-shape: Efficient and accurate clustering of time series[C]//Proceedings of the 2015 ACM SIGMOD international conference on management of data. 2015: 1855-1870.</a:t>
+            </a:r>
+            <a:endParaRPr lang="zh-CN" altLang="en-US" sz="1100" dirty="0"/>
           </a:p>
         </p:txBody>
       </p:sp>
@@ -12421,7 +12667,7 @@
         </p:nvSpPr>
         <p:spPr>
           <a:xfrm>
-            <a:off x="1122219" y="423950"/>
+            <a:off x="1122219" y="92845"/>
             <a:ext cx="5931724" cy="461665"/>
           </a:xfrm>
           <a:prstGeom prst="rect">
@@ -12467,8 +12713,8 @@
         </p:nvSpPr>
         <p:spPr>
           <a:xfrm>
-            <a:off x="1122219" y="1184152"/>
-            <a:ext cx="10111839" cy="5355312"/>
+            <a:off x="1122219" y="554510"/>
+            <a:ext cx="10111839" cy="6186309"/>
           </a:xfrm>
           <a:prstGeom prst="rect">
             <a:avLst/>
@@ -12536,6 +12782,18 @@
             <a:r>
               <a:rPr lang="en-US" altLang="zh-CN" dirty="0"/>
               <a:t>4. In the current thesis, when mentioning 'Time Alignment' or 'DTW,' they are often used for clustering, classification, and data argumentation. Can we refer to the current work as 'DTW for Regression'? Compared to 'DTW for Classification,' 'DTW for Regression' has a distinct focus.</a:t>
+            </a:r>
+          </a:p>
+          <a:p>
+            <a:endParaRPr lang="en-US" altLang="zh-CN" dirty="0"/>
+          </a:p>
+          <a:p>
+            <a:endParaRPr lang="en-US" altLang="zh-CN" dirty="0"/>
+          </a:p>
+          <a:p>
+            <a:r>
+              <a:rPr lang="en-US" altLang="zh-CN" dirty="0"/>
+              <a:t>5. Do you think the tutorial we wrote is too simple?</a:t>
             </a:r>
           </a:p>
         </p:txBody>
@@ -13047,13 +13305,13 @@
           <p:nvPr>
             <p:extLst>
               <p:ext uri="{D42A27DB-BD31-4B8C-83A1-F6EECF244321}">
-                <p14:modId xmlns:p14="http://schemas.microsoft.com/office/powerpoint/2010/main" val="2135905006"/>
+                <p14:modId xmlns:p14="http://schemas.microsoft.com/office/powerpoint/2010/main" val="706128819"/>
               </p:ext>
             </p:extLst>
           </p:nvPr>
         </p:nvGraphicFramePr>
         <p:xfrm>
-          <a:off x="991419" y="1630320"/>
+          <a:off x="609600" y="702759"/>
           <a:ext cx="10209162" cy="3708400"/>
         </p:xfrm>
         <a:graphic>
@@ -14035,41 +14293,66 @@
           </a:graphicData>
         </a:graphic>
       </p:graphicFrame>
-      <p:sp>
-        <p:nvSpPr>
-          <p:cNvPr id="4" name="文本框 3">
+      <p:pic>
+        <p:nvPicPr>
+          <p:cNvPr id="5" name="图片 4">
             <a:extLst>
               <a:ext uri="{FF2B5EF4-FFF2-40B4-BE49-F238E27FC236}">
-                <a16:creationId xmlns:a16="http://schemas.microsoft.com/office/drawing/2014/main" id="{14D98BF9-A99F-6EAF-3F10-E905FE1F2A03}"/>
+                <a16:creationId xmlns:a16="http://schemas.microsoft.com/office/drawing/2014/main" id="{F58FBEDA-0D0F-353F-F66E-0F1A331F74EA}"/>
               </a:ext>
             </a:extLst>
           </p:cNvPr>
-          <p:cNvSpPr txBox="1"/>
+          <p:cNvPicPr>
+            <a:picLocks noChangeAspect="1"/>
+          </p:cNvPicPr>
           <p:nvPr/>
-        </p:nvSpPr>
+        </p:nvPicPr>
+        <p:blipFill>
+          <a:blip r:embed="rId3"/>
+          <a:stretch>
+            <a:fillRect/>
+          </a:stretch>
+        </p:blipFill>
         <p:spPr>
           <a:xfrm>
-            <a:off x="938366" y="914452"/>
-            <a:ext cx="6094770" cy="369332"/>
+            <a:off x="413827" y="4546002"/>
+            <a:ext cx="5958197" cy="2179749"/>
           </a:xfrm>
           <a:prstGeom prst="rect">
             <a:avLst/>
           </a:prstGeom>
-          <a:noFill/>
         </p:spPr>
-        <p:txBody>
-          <a:bodyPr wrap="square">
-            <a:spAutoFit/>
-          </a:bodyPr>
-          <a:lstStyle/>
-          <a:p>
-            <a:r>
-              <a:rPr lang="en-US" altLang="zh-CN" dirty="0"/>
-              <a:t>Experiment Results</a:t>
-            </a:r>
-          </a:p>
-        </p:txBody>
-      </p:sp>
+      </p:pic>
+      <p:pic>
+        <p:nvPicPr>
+          <p:cNvPr id="7" name="图片 6">
+            <a:extLst>
+              <a:ext uri="{FF2B5EF4-FFF2-40B4-BE49-F238E27FC236}">
+                <a16:creationId xmlns:a16="http://schemas.microsoft.com/office/drawing/2014/main" id="{3C23FA2F-AE80-462C-576D-36CA5A388D7F}"/>
+              </a:ext>
+            </a:extLst>
+          </p:cNvPr>
+          <p:cNvPicPr>
+            <a:picLocks noChangeAspect="1"/>
+          </p:cNvPicPr>
+          <p:nvPr/>
+        </p:nvPicPr>
+        <p:blipFill>
+          <a:blip r:embed="rId4"/>
+          <a:stretch>
+            <a:fillRect/>
+          </a:stretch>
+        </p:blipFill>
+        <p:spPr>
+          <a:xfrm>
+            <a:off x="6096000" y="4678252"/>
+            <a:ext cx="5610426" cy="2047500"/>
+          </a:xfrm>
+          <a:prstGeom prst="rect">
+            <a:avLst/>
+          </a:prstGeom>
+        </p:spPr>
+      </p:pic>
     </p:spTree>
     <p:extLst>
       <p:ext uri="{BB962C8B-B14F-4D97-AF65-F5344CB8AC3E}">

</xml_diff>